<commit_message>
Atualiza Plano de iteração 3
</commit_message>
<xml_diff>
--- a/Acompanhamento/iteração 03/Plano_de_Iteracao3.pptx
+++ b/Acompanhamento/iteração 03/Plano_de_Iteracao3.pptx
@@ -18080,14 +18080,14 @@
           <p:nvPr>
             <p:extLst>
               <p:ext uri="{D42A27DB-BD31-4B8C-83A1-F6EECF244321}">
-                <p14:modId xmlns:p14="http://schemas.microsoft.com/office/powerpoint/2010/main" val="1691907158"/>
+                <p14:modId xmlns:p14="http://schemas.microsoft.com/office/powerpoint/2010/main" val="3571893502"/>
               </p:ext>
             </p:extLst>
           </p:nvPr>
         </p:nvGraphicFramePr>
         <p:xfrm>
           <a:off x="440267" y="2152650"/>
-          <a:ext cx="8279884" cy="3927655"/>
+          <a:ext cx="8279884" cy="3800291"/>
         </p:xfrm>
         <a:graphic>
           <a:graphicData uri="http://schemas.openxmlformats.org/drawingml/2006/table">
@@ -18312,6 +18312,15 @@
                     </a:p>
                   </a:txBody>
                   <a:tcPr marL="91425" marR="91425" marT="91425" marB="91425">
+                    <a:lnR w="12700" cap="flat" cmpd="sng" algn="ctr">
+                      <a:solidFill>
+                        <a:schemeClr val="tx1"/>
+                      </a:solidFill>
+                      <a:prstDash val="solid"/>
+                      <a:round/>
+                      <a:headEnd type="none" w="med" len="med"/>
+                      <a:tailEnd type="none" w="med" len="med"/>
+                    </a:lnR>
                     <a:solidFill>
                       <a:srgbClr val="052A4D"/>
                     </a:solidFill>
@@ -18369,6 +18378,15 @@
                     </a:p>
                   </a:txBody>
                   <a:tcPr marL="91425" marR="91425" marT="91425" marB="91425">
+                    <a:lnL w="12700" cap="flat" cmpd="sng" algn="ctr">
+                      <a:solidFill>
+                        <a:schemeClr val="tx1"/>
+                      </a:solidFill>
+                      <a:prstDash val="solid"/>
+                      <a:round/>
+                      <a:headEnd type="none" w="med" len="med"/>
+                      <a:tailEnd type="none" w="med" len="med"/>
+                    </a:lnL>
                     <a:solidFill>
                       <a:srgbClr val="052A4D"/>
                     </a:solidFill>
@@ -18551,8 +18569,8 @@
                   </a:ext>
                 </a:extLst>
               </a:tr>
-              <a:tr h="1560700">
-                <a:tc>
+              <a:tr h="736771">
+                <a:tc rowSpan="2">
                   <a:txBody>
                     <a:bodyPr/>
                     <a:lstStyle/>
@@ -18601,7 +18619,7 @@
                     </a:solidFill>
                   </a:tcPr>
                 </a:tc>
-                <a:tc gridSpan="6">
+                <a:tc gridSpan="2">
                   <a:txBody>
                     <a:bodyPr/>
                     <a:lstStyle/>
@@ -18628,7 +18646,7 @@
                           <a:cs typeface="Roboto"/>
                           <a:sym typeface="Roboto"/>
                         </a:rPr>
-                        <a:t>Implementar Agendamento de consultas odontológicas</a:t>
+                        <a:t>Correções da iteração passada</a:t>
                       </a:r>
                       <a:endParaRPr sz="1000" dirty="0">
                         <a:latin typeface="Roboto"/>
@@ -18639,20 +18657,26 @@
                     </a:p>
                   </a:txBody>
                   <a:tcPr marL="91425" marR="91425" marT="91425" marB="91425" anchor="ctr">
-                    <a:lnB w="9525" cap="flat" cmpd="sng" algn="ctr">
+                    <a:lnR w="12700" cap="flat" cmpd="sng" algn="ctr">
                       <a:solidFill>
-                        <a:srgbClr val="9E9E9E"/>
+                        <a:schemeClr val="tx1"/>
                       </a:solidFill>
                       <a:prstDash val="solid"/>
                       <a:round/>
-                      <a:headEnd type="none" w="sm" len="sm"/>
-                      <a:tailEnd type="none" w="sm" len="sm"/>
+                      <a:headEnd type="none" w="med" len="med"/>
+                      <a:tailEnd type="none" w="med" len="med"/>
+                    </a:lnR>
+                    <a:lnB w="12700" cap="flat" cmpd="sng" algn="ctr">
+                      <a:solidFill>
+                        <a:schemeClr val="tx1"/>
+                      </a:solidFill>
+                      <a:prstDash val="solid"/>
+                      <a:round/>
+                      <a:headEnd type="none" w="med" len="med"/>
+                      <a:tailEnd type="none" w="med" len="med"/>
                     </a:lnB>
                     <a:solidFill>
-                      <a:schemeClr val="bg2">
-                        <a:lumMod val="60000"/>
-                        <a:lumOff val="40000"/>
-                      </a:schemeClr>
+                      <a:schemeClr val="accent2"/>
                     </a:solidFill>
                   </a:tcPr>
                 </a:tc>
@@ -18703,17 +18727,78 @@
                     </a:solidFill>
                   </a:tcPr>
                 </a:tc>
-                <a:tc hMerge="1">
+                <a:tc rowSpan="2" gridSpan="4">
                   <a:txBody>
                     <a:bodyPr/>
                     <a:lstStyle/>
                     <a:p>
-                      <a:endParaRPr lang="pt-BR"/>
+                      <a:pPr marL="0" marR="0" lvl="0" indent="0" algn="ctr" defTabSz="914400" rtl="0" eaLnBrk="1" fontAlgn="auto" latinLnBrk="0" hangingPunct="1">
+                        <a:lnSpc>
+                          <a:spcPct val="115000"/>
+                        </a:lnSpc>
+                        <a:spcBef>
+                          <a:spcPts val="0"/>
+                        </a:spcBef>
+                        <a:spcAft>
+                          <a:spcPts val="0"/>
+                        </a:spcAft>
+                        <a:buClr>
+                          <a:srgbClr val="000000"/>
+                        </a:buClr>
+                        <a:buSzTx/>
+                        <a:buFont typeface="Arial"/>
+                        <a:buNone/>
+                        <a:tabLst/>
+                        <a:defRPr/>
+                      </a:pPr>
+                      <a:r>
+                        <a:rPr lang="pt-BR" sz="1000" dirty="0">
+                          <a:solidFill>
+                            <a:schemeClr val="dk1"/>
+                          </a:solidFill>
+                          <a:latin typeface="Roboto"/>
+                          <a:ea typeface="Roboto"/>
+                          <a:cs typeface="Roboto"/>
+                          <a:sym typeface="Roboto"/>
+                        </a:rPr>
+                        <a:t>Implementar Agendamento de consultas odontológicas</a:t>
+                      </a:r>
+                      <a:endParaRPr lang="pt-BR" sz="1000" dirty="0">
+                        <a:latin typeface="Roboto"/>
+                        <a:ea typeface="Roboto"/>
+                        <a:cs typeface="Roboto"/>
+                        <a:sym typeface="Roboto"/>
+                      </a:endParaRPr>
                     </a:p>
                   </a:txBody>
-                  <a:tcPr/>
+                  <a:tcPr marL="91425" marR="91425" marT="91425" marB="91425" anchor="ctr">
+                    <a:lnL w="12700" cap="flat" cmpd="sng" algn="ctr">
+                      <a:solidFill>
+                        <a:schemeClr val="tx1"/>
+                      </a:solidFill>
+                      <a:prstDash val="solid"/>
+                      <a:round/>
+                      <a:headEnd type="none" w="med" len="med"/>
+                      <a:tailEnd type="none" w="med" len="med"/>
+                    </a:lnL>
+                    <a:lnB w="9525" cap="flat" cmpd="sng" algn="ctr">
+                      <a:solidFill>
+                        <a:srgbClr val="9E9E9E"/>
+                      </a:solidFill>
+                      <a:prstDash val="solid"/>
+                      <a:round/>
+                      <a:headEnd type="none" w="sm" len="sm"/>
+                      <a:tailEnd type="none" w="sm" len="sm"/>
+                    </a:lnB>
+                    <a:solidFill>
+                      <a:schemeClr val="bg2">
+                        <a:lumMod val="60000"/>
+                        <a:lumOff val="40000"/>
+                      </a:schemeClr>
+                    </a:solidFill>
+                  </a:tcPr>
                 </a:tc>
-                <a:tc hMerge="1">
+                <a:tc rowSpan="2" hMerge="1">
                   <a:txBody>
                     <a:bodyPr/>
                     <a:lstStyle/>
@@ -18749,7 +18834,7 @@
                     </a:solidFill>
                   </a:tcPr>
                 </a:tc>
-                <a:tc hMerge="1">
+                <a:tc rowSpan="2" hMerge="1">
                   <a:txBody>
                     <a:bodyPr/>
                     <a:lstStyle/>
@@ -18785,7 +18870,7 @@
                     </a:solidFill>
                   </a:tcPr>
                 </a:tc>
-                <a:tc hMerge="1">
+                <a:tc rowSpan="2" hMerge="1">
                   <a:txBody>
                     <a:bodyPr/>
                     <a:lstStyle/>
@@ -18819,6 +18904,222 @@
                 <a:extLst>
                   <a:ext uri="{0D108BD9-81ED-4DB2-BD59-A6C34878D82A}">
                     <a16:rowId xmlns:a16="http://schemas.microsoft.com/office/drawing/2014/main" val="10001"/>
+                  </a:ext>
+                </a:extLst>
+              </a:tr>
+              <a:tr h="590369">
+                <a:tc vMerge="1">
+                  <a:txBody>
+                    <a:bodyPr/>
+                    <a:lstStyle/>
+                    <a:p>
+                      <a:endParaRPr lang="pt-BR"/>
+                    </a:p>
+                  </a:txBody>
+                  <a:tcPr/>
+                </a:tc>
+                <a:tc gridSpan="2">
+                  <a:txBody>
+                    <a:bodyPr/>
+                    <a:lstStyle/>
+                    <a:p>
+                      <a:pPr marL="0" marR="0" lvl="0" indent="0" algn="ctr" defTabSz="914400" rtl="0" eaLnBrk="1" fontAlgn="auto" latinLnBrk="0" hangingPunct="1">
+                        <a:lnSpc>
+                          <a:spcPct val="115000"/>
+                        </a:lnSpc>
+                        <a:spcBef>
+                          <a:spcPts val="0"/>
+                        </a:spcBef>
+                        <a:spcAft>
+                          <a:spcPts val="0"/>
+                        </a:spcAft>
+                        <a:buClr>
+                          <a:srgbClr val="000000"/>
+                        </a:buClr>
+                        <a:buSzTx/>
+                        <a:buFont typeface="Arial"/>
+                        <a:buNone/>
+                        <a:tabLst/>
+                        <a:defRPr/>
+                      </a:pPr>
+                      <a:r>
+                        <a:rPr lang="pt-BR" sz="1000" dirty="0">
+                          <a:solidFill>
+                            <a:schemeClr val="dk1"/>
+                          </a:solidFill>
+                          <a:latin typeface="Roboto"/>
+                          <a:ea typeface="Roboto"/>
+                          <a:cs typeface="Roboto"/>
+                          <a:sym typeface="Roboto"/>
+                        </a:rPr>
+                        <a:t>Implementar Agendamento de consultas odontológicas</a:t>
+                      </a:r>
+                      <a:endParaRPr lang="pt-BR" sz="1000" dirty="0">
+                        <a:latin typeface="Roboto"/>
+                        <a:ea typeface="Roboto"/>
+                        <a:cs typeface="Roboto"/>
+                        <a:sym typeface="Roboto"/>
+                      </a:endParaRPr>
+                    </a:p>
+                    <a:p>
+                      <a:pPr marL="0" lvl="0" indent="0" algn="ctr" rtl="0">
+                        <a:lnSpc>
+                          <a:spcPct val="115000"/>
+                        </a:lnSpc>
+                        <a:spcBef>
+                          <a:spcPts val="0"/>
+                        </a:spcBef>
+                        <a:spcAft>
+                          <a:spcPts val="0"/>
+                        </a:spcAft>
+                        <a:buNone/>
+                      </a:pPr>
+                      <a:endParaRPr sz="1000" dirty="0">
+                        <a:latin typeface="Roboto"/>
+                        <a:ea typeface="Roboto"/>
+                        <a:cs typeface="Roboto"/>
+                        <a:sym typeface="Roboto"/>
+                      </a:endParaRPr>
+                    </a:p>
+                  </a:txBody>
+                  <a:tcPr marL="91425" marR="91425" marT="91425" marB="91425" anchor="ctr">
+                    <a:lnR w="12700" cap="flat" cmpd="sng" algn="ctr">
+                      <a:noFill/>
+                      <a:prstDash val="solid"/>
+                      <a:round/>
+                      <a:headEnd type="none" w="med" len="med"/>
+                      <a:tailEnd type="none" w="med" len="med"/>
+                    </a:lnR>
+                    <a:lnT w="12700" cap="flat" cmpd="sng" algn="ctr">
+                      <a:solidFill>
+                        <a:schemeClr val="tx1"/>
+                      </a:solidFill>
+                      <a:prstDash val="solid"/>
+                      <a:round/>
+                      <a:headEnd type="none" w="med" len="med"/>
+                      <a:tailEnd type="none" w="med" len="med"/>
+                    </a:lnT>
+                    <a:lnB w="9525" cap="flat" cmpd="sng" algn="ctr">
+                      <a:solidFill>
+                        <a:srgbClr val="9E9E9E"/>
+                      </a:solidFill>
+                      <a:prstDash val="solid"/>
+                      <a:round/>
+                      <a:headEnd type="none" w="sm" len="sm"/>
+                      <a:tailEnd type="none" w="sm" len="sm"/>
+                    </a:lnB>
+                    <a:solidFill>
+                      <a:schemeClr val="bg2">
+                        <a:lumMod val="60000"/>
+                        <a:lumOff val="40000"/>
+                      </a:schemeClr>
+                    </a:solidFill>
+                  </a:tcPr>
+                </a:tc>
+                <a:tc hMerge="1">
+                  <a:txBody>
+                    <a:bodyPr/>
+                    <a:lstStyle/>
+                    <a:p>
+                      <a:endParaRPr lang="pt-BR"/>
+                    </a:p>
+                  </a:txBody>
+                  <a:tcPr/>
+                </a:tc>
+                <a:tc gridSpan="4" vMerge="1">
+                  <a:txBody>
+                    <a:bodyPr/>
+                    <a:lstStyle/>
+                    <a:p>
+                      <a:pPr marL="0" lvl="0" indent="0" algn="ctr" rtl="0">
+                        <a:lnSpc>
+                          <a:spcPct val="115000"/>
+                        </a:lnSpc>
+                        <a:spcBef>
+                          <a:spcPts val="0"/>
+                        </a:spcBef>
+                        <a:spcAft>
+                          <a:spcPts val="0"/>
+                        </a:spcAft>
+                        <a:buNone/>
+                      </a:pPr>
+                      <a:endParaRPr sz="1000" dirty="0">
+                        <a:latin typeface="Roboto"/>
+                        <a:ea typeface="Roboto"/>
+                        <a:cs typeface="Roboto"/>
+                        <a:sym typeface="Roboto"/>
+                      </a:endParaRPr>
+                    </a:p>
+                  </a:txBody>
+                  <a:tcPr marL="91425" marR="91425" marT="91425" marB="91425" anchor="ctr">
+                    <a:lnL w="12700" cap="flat" cmpd="sng" algn="ctr">
+                      <a:solidFill>
+                        <a:schemeClr val="tx1"/>
+                      </a:solidFill>
+                      <a:prstDash val="solid"/>
+                      <a:round/>
+                      <a:headEnd type="none" w="med" len="med"/>
+                      <a:tailEnd type="none" w="med" len="med"/>
+                    </a:lnL>
+                    <a:lnT w="12700" cap="flat" cmpd="sng" algn="ctr">
+                      <a:solidFill>
+                        <a:schemeClr val="tx1"/>
+                      </a:solidFill>
+                      <a:prstDash val="solid"/>
+                      <a:round/>
+                      <a:headEnd type="none" w="med" len="med"/>
+                      <a:tailEnd type="none" w="med" len="med"/>
+                    </a:lnT>
+                    <a:lnB w="9525" cap="flat" cmpd="sng" algn="ctr">
+                      <a:solidFill>
+                        <a:srgbClr val="9E9E9E"/>
+                      </a:solidFill>
+                      <a:prstDash val="solid"/>
+                      <a:round/>
+                      <a:headEnd type="none" w="sm" len="sm"/>
+                      <a:tailEnd type="none" w="sm" len="sm"/>
+                    </a:lnB>
+                    <a:solidFill>
+                      <a:schemeClr val="bg2">
+                        <a:lumMod val="60000"/>
+                        <a:lumOff val="40000"/>
+                      </a:schemeClr>
+                    </a:solidFill>
+                  </a:tcPr>
+                </a:tc>
+                <a:tc hMerge="1" vMerge="1">
+                  <a:txBody>
+                    <a:bodyPr/>
+                    <a:lstStyle/>
+                    <a:p>
+                      <a:endParaRPr lang="pt-BR"/>
+                    </a:p>
+                  </a:txBody>
+                  <a:tcPr/>
+                </a:tc>
+                <a:tc hMerge="1" vMerge="1">
+                  <a:txBody>
+                    <a:bodyPr/>
+                    <a:lstStyle/>
+                    <a:p>
+                      <a:endParaRPr lang="pt-BR"/>
+                    </a:p>
+                  </a:txBody>
+                  <a:tcPr/>
+                </a:tc>
+                <a:tc hMerge="1" vMerge="1">
+                  <a:txBody>
+                    <a:bodyPr/>
+                    <a:lstStyle/>
+                    <a:p>
+                      <a:endParaRPr lang="pt-BR"/>
+                    </a:p>
+                  </a:txBody>
+                  <a:tcPr/>
+                </a:tc>
+                <a:extLst>
+                  <a:ext uri="{0D108BD9-81ED-4DB2-BD59-A6C34878D82A}">
+                    <a16:rowId xmlns:a16="http://schemas.microsoft.com/office/drawing/2014/main" val="3784050221"/>
                   </a:ext>
                 </a:extLst>
               </a:tr>

</xml_diff>

<commit_message>
Atualiza Plano da Iteração 3
</commit_message>
<xml_diff>
--- a/Acompanhamento/iteração 03/Plano_de_Iteracao3.pptx
+++ b/Acompanhamento/iteração 03/Plano_de_Iteracao3.pptx
@@ -17651,15 +17651,33 @@
               <a:buNone/>
             </a:pPr>
             <a:r>
-              <a:rPr lang="en-US">
+              <a:rPr lang="en-US" dirty="0" err="1">
                 <a:latin typeface="Roboto"/>
                 <a:ea typeface="Roboto"/>
                 <a:cs typeface="Roboto"/>
                 <a:sym typeface="Roboto"/>
               </a:rPr>
-              <a:t>Papel da Equipe</a:t>
+              <a:t>Papel</a:t>
             </a:r>
-            <a:endParaRPr>
+            <a:r>
+              <a:rPr lang="en-US" dirty="0">
+                <a:latin typeface="Roboto"/>
+                <a:ea typeface="Roboto"/>
+                <a:cs typeface="Roboto"/>
+                <a:sym typeface="Roboto"/>
+              </a:rPr>
+              <a:t> da </a:t>
+            </a:r>
+            <a:r>
+              <a:rPr lang="en-US" dirty="0" err="1">
+                <a:latin typeface="Roboto"/>
+                <a:ea typeface="Roboto"/>
+                <a:cs typeface="Roboto"/>
+                <a:sym typeface="Roboto"/>
+              </a:rPr>
+              <a:t>Equipe</a:t>
+            </a:r>
+            <a:endParaRPr dirty="0">
               <a:latin typeface="Roboto"/>
               <a:ea typeface="Roboto"/>
               <a:cs typeface="Roboto"/>
@@ -17771,7 +17789,7 @@
                 <a:cs typeface="Roboto"/>
                 <a:sym typeface="Roboto"/>
               </a:rPr>
-              <a:t>Back-end, testes, front-end, </a:t>
+              <a:t>Back-end, testes, </a:t>
             </a:r>
             <a:r>
               <a:rPr lang="en-US" dirty="0" err="1">
@@ -17894,95 +17912,6 @@
                 <a:sym typeface="Roboto"/>
               </a:rPr>
               <a:t>qualidade</a:t>
-            </a:r>
-            <a:endParaRPr dirty="0">
-              <a:solidFill>
-                <a:srgbClr val="0B5394"/>
-              </a:solidFill>
-              <a:latin typeface="Roboto"/>
-              <a:ea typeface="Roboto"/>
-              <a:cs typeface="Roboto"/>
-              <a:sym typeface="Roboto"/>
-            </a:endParaRPr>
-          </a:p>
-          <a:p>
-            <a:pPr marL="457200" marR="0" lvl="0" indent="-355600" algn="l" rtl="0">
-              <a:lnSpc>
-                <a:spcPct val="115000"/>
-              </a:lnSpc>
-              <a:spcBef>
-                <a:spcPts val="1600"/>
-              </a:spcBef>
-              <a:spcAft>
-                <a:spcPts val="0"/>
-              </a:spcAft>
-              <a:buClr>
-                <a:srgbClr val="0B5394"/>
-              </a:buClr>
-              <a:buSzPts val="2000"/>
-              <a:buFont typeface="Roboto"/>
-              <a:buChar char="•"/>
-            </a:pPr>
-            <a:r>
-              <a:rPr lang="en-US" dirty="0">
-                <a:solidFill>
-                  <a:srgbClr val="0B5394"/>
-                </a:solidFill>
-                <a:latin typeface="Roboto"/>
-                <a:ea typeface="Roboto"/>
-                <a:cs typeface="Roboto"/>
-                <a:sym typeface="Roboto"/>
-              </a:rPr>
-              <a:t>Marcos </a:t>
-            </a:r>
-            <a:r>
-              <a:rPr lang="en-US" dirty="0" err="1">
-                <a:solidFill>
-                  <a:srgbClr val="0B5394"/>
-                </a:solidFill>
-                <a:latin typeface="Roboto"/>
-                <a:ea typeface="Roboto"/>
-                <a:cs typeface="Roboto"/>
-                <a:sym typeface="Roboto"/>
-              </a:rPr>
-              <a:t>Fábio</a:t>
-            </a:r>
-            <a:endParaRPr dirty="0">
-              <a:solidFill>
-                <a:srgbClr val="0B5394"/>
-              </a:solidFill>
-              <a:latin typeface="Roboto"/>
-              <a:ea typeface="Roboto"/>
-              <a:cs typeface="Roboto"/>
-              <a:sym typeface="Roboto"/>
-            </a:endParaRPr>
-          </a:p>
-          <a:p>
-            <a:pPr marL="914400" lvl="1" indent="-330200" algn="l" rtl="0">
-              <a:spcBef>
-                <a:spcPts val="1600"/>
-              </a:spcBef>
-              <a:spcAft>
-                <a:spcPts val="1600"/>
-              </a:spcAft>
-              <a:buClr>
-                <a:srgbClr val="0B5394"/>
-              </a:buClr>
-              <a:buSzPts val="1600"/>
-              <a:buFont typeface="Roboto"/>
-              <a:buChar char="–"/>
-            </a:pPr>
-            <a:r>
-              <a:rPr lang="en-US" dirty="0">
-                <a:solidFill>
-                  <a:srgbClr val="0B5394"/>
-                </a:solidFill>
-                <a:latin typeface="Roboto"/>
-                <a:ea typeface="Roboto"/>
-                <a:cs typeface="Roboto"/>
-                <a:sym typeface="Roboto"/>
-              </a:rPr>
-              <a:t>Back-end, DBA, testes</a:t>
             </a:r>
             <a:endParaRPr dirty="0">
               <a:solidFill>
@@ -18033,7 +17962,7 @@
         </p:nvSpPr>
         <p:spPr>
           <a:xfrm>
-            <a:off x="762025" y="1171853"/>
+            <a:off x="770209" y="313897"/>
             <a:ext cx="7620000" cy="771300"/>
           </a:xfrm>
           <a:prstGeom prst="rect">
@@ -18080,14 +18009,14 @@
           <p:nvPr>
             <p:extLst>
               <p:ext uri="{D42A27DB-BD31-4B8C-83A1-F6EECF244321}">
-                <p14:modId xmlns:p14="http://schemas.microsoft.com/office/powerpoint/2010/main" val="3571893502"/>
+                <p14:modId xmlns:p14="http://schemas.microsoft.com/office/powerpoint/2010/main" val="3591735988"/>
               </p:ext>
             </p:extLst>
           </p:nvPr>
         </p:nvGraphicFramePr>
         <p:xfrm>
-          <a:off x="440267" y="2152650"/>
-          <a:ext cx="8279884" cy="3800291"/>
+          <a:off x="654755" y="1085197"/>
+          <a:ext cx="8279884" cy="3701293"/>
         </p:xfrm>
         <a:graphic>
           <a:graphicData uri="http://schemas.openxmlformats.org/drawingml/2006/table">
@@ -18147,7 +18076,7 @@
                   </a:extLst>
                 </a:gridCol>
               </a:tblGrid>
-              <a:tr h="330906">
+              <a:tr h="393144">
                 <a:tc>
                   <a:txBody>
                     <a:bodyPr/>
@@ -18569,7 +18498,7 @@
                   </a:ext>
                 </a:extLst>
               </a:tr>
-              <a:tr h="736771">
+              <a:tr h="660063">
                 <a:tc rowSpan="2">
                   <a:txBody>
                     <a:bodyPr/>
@@ -18727,7 +18656,7 @@
                     </a:solidFill>
                   </a:tcPr>
                 </a:tc>
-                <a:tc rowSpan="2" gridSpan="4">
+                <a:tc rowSpan="2" gridSpan="3">
                   <a:txBody>
                     <a:bodyPr/>
                     <a:lstStyle/>
@@ -18781,6 +18710,15 @@
                       <a:headEnd type="none" w="med" len="med"/>
                       <a:tailEnd type="none" w="med" len="med"/>
                     </a:lnL>
+                    <a:lnR w="12700" cap="flat" cmpd="sng" algn="ctr">
+                      <a:solidFill>
+                        <a:schemeClr val="tx1"/>
+                      </a:solidFill>
+                      <a:prstDash val="solid"/>
+                      <a:round/>
+                      <a:headEnd type="none" w="med" len="med"/>
+                      <a:tailEnd type="none" w="med" len="med"/>
+                    </a:lnR>
                     <a:lnB w="9525" cap="flat" cmpd="sng" algn="ctr">
                       <a:solidFill>
                         <a:srgbClr val="9E9E9E"/>
@@ -18870,12 +18808,12 @@
                     </a:solidFill>
                   </a:tcPr>
                 </a:tc>
-                <a:tc rowSpan="2" hMerge="1">
+                <a:tc rowSpan="2">
                   <a:txBody>
                     <a:bodyPr/>
                     <a:lstStyle/>
                     <a:p>
-                      <a:pPr marL="0" lvl="0" indent="0" algn="ctr" rtl="0">
+                      <a:pPr marL="0" marR="0" lvl="0" indent="0" algn="ctr" defTabSz="914400" rtl="0" eaLnBrk="1" fontAlgn="auto" latinLnBrk="0" hangingPunct="1">
                         <a:lnSpc>
                           <a:spcPct val="115000"/>
                         </a:lnSpc>
@@ -18885,9 +18823,16 @@
                         <a:spcAft>
                           <a:spcPts val="0"/>
                         </a:spcAft>
+                        <a:buClr>
+                          <a:srgbClr val="000000"/>
+                        </a:buClr>
+                        <a:buSzTx/>
+                        <a:buFont typeface="Arial"/>
                         <a:buNone/>
+                        <a:tabLst/>
+                        <a:defRPr/>
                       </a:pPr>
-                      <a:endParaRPr sz="1000">
+                      <a:endParaRPr lang="pt-BR" sz="1000" dirty="0">
                         <a:latin typeface="Roboto"/>
                         <a:ea typeface="Roboto"/>
                         <a:cs typeface="Roboto"/>
@@ -18896,8 +18841,26 @@
                     </a:p>
                   </a:txBody>
                   <a:tcPr marL="91425" marR="91425" marT="91425" marB="91425" anchor="ctr">
+                    <a:lnL w="12700" cap="flat" cmpd="sng" algn="ctr">
+                      <a:solidFill>
+                        <a:schemeClr val="tx1"/>
+                      </a:solidFill>
+                      <a:prstDash val="solid"/>
+                      <a:round/>
+                      <a:headEnd type="none" w="med" len="med"/>
+                      <a:tailEnd type="none" w="med" len="med"/>
+                    </a:lnL>
+                    <a:lnB w="9525" cap="flat" cmpd="sng" algn="ctr">
+                      <a:solidFill>
+                        <a:srgbClr val="9E9E9E"/>
+                      </a:solidFill>
+                      <a:prstDash val="solid"/>
+                      <a:round/>
+                      <a:headEnd type="none" w="sm" len="sm"/>
+                      <a:tailEnd type="none" w="sm" len="sm"/>
+                    </a:lnB>
                     <a:solidFill>
-                      <a:srgbClr val="C9DAF8"/>
+                      <a:schemeClr val="bg1"/>
                     </a:solidFill>
                   </a:tcPr>
                 </a:tc>
@@ -18907,7 +18870,7 @@
                   </a:ext>
                 </a:extLst>
               </a:tr>
-              <a:tr h="590369">
+              <a:tr h="781335">
                 <a:tc vMerge="1">
                   <a:txBody>
                     <a:bodyPr/>
@@ -19026,7 +18989,7 @@
                   </a:txBody>
                   <a:tcPr/>
                 </a:tc>
-                <a:tc gridSpan="4" vMerge="1">
+                <a:tc gridSpan="3" vMerge="1">
                   <a:txBody>
                     <a:bodyPr/>
                     <a:lstStyle/>
@@ -19107,7 +19070,7 @@
                   </a:txBody>
                   <a:tcPr/>
                 </a:tc>
-                <a:tc hMerge="1" vMerge="1">
+                <a:tc vMerge="1">
                   <a:txBody>
                     <a:bodyPr/>
                     <a:lstStyle/>
@@ -19123,7 +19086,7 @@
                   </a:ext>
                 </a:extLst>
               </a:tr>
-              <a:tr h="344775">
+              <a:tr h="374227">
                 <a:tc>
                   <a:txBody>
                     <a:bodyPr/>
@@ -19749,7 +19712,1319 @@
                   </a:ext>
                 </a:extLst>
               </a:tr>
-              <a:tr h="828225">
+              <a:tr h="1492524">
+                <a:tc gridSpan="3">
+                  <a:txBody>
+                    <a:bodyPr/>
+                    <a:lstStyle/>
+                    <a:p>
+                      <a:pPr marL="0" lvl="0" indent="0" algn="ctr" rtl="0">
+                        <a:lnSpc>
+                          <a:spcPct val="115000"/>
+                        </a:lnSpc>
+                        <a:spcBef>
+                          <a:spcPts val="0"/>
+                        </a:spcBef>
+                        <a:spcAft>
+                          <a:spcPts val="0"/>
+                        </a:spcAft>
+                        <a:buNone/>
+                      </a:pPr>
+                      <a:endParaRPr lang="pt-BR" sz="1000" dirty="0">
+                        <a:latin typeface="Roboto"/>
+                        <a:ea typeface="Roboto"/>
+                        <a:cs typeface="Roboto"/>
+                        <a:sym typeface="Roboto"/>
+                      </a:endParaRPr>
+                    </a:p>
+                  </a:txBody>
+                  <a:tcPr marL="91425" marR="91425" marT="91425" marB="91425" anchor="ctr">
+                    <a:lnL w="9525" cap="flat" cmpd="sng">
+                      <a:solidFill>
+                        <a:srgbClr val="9E9E9E"/>
+                      </a:solidFill>
+                      <a:prstDash val="solid"/>
+                      <a:round/>
+                      <a:headEnd type="none" w="sm" len="sm"/>
+                      <a:tailEnd type="none" w="sm" len="sm"/>
+                    </a:lnL>
+                    <a:lnR w="12700" cap="flat" cmpd="sng" algn="ctr">
+                      <a:solidFill>
+                        <a:schemeClr val="tx1"/>
+                      </a:solidFill>
+                      <a:prstDash val="solid"/>
+                      <a:round/>
+                      <a:headEnd type="none" w="med" len="med"/>
+                      <a:tailEnd type="none" w="med" len="med"/>
+                    </a:lnR>
+                    <a:lnT w="9525" cap="flat" cmpd="sng">
+                      <a:solidFill>
+                        <a:srgbClr val="9E9E9E"/>
+                      </a:solidFill>
+                      <a:prstDash val="solid"/>
+                      <a:round/>
+                      <a:headEnd type="none" w="sm" len="sm"/>
+                      <a:tailEnd type="none" w="sm" len="sm"/>
+                    </a:lnT>
+                    <a:lnB w="9525" cap="flat" cmpd="sng" algn="ctr">
+                      <a:solidFill>
+                        <a:srgbClr val="9E9E9E"/>
+                      </a:solidFill>
+                      <a:prstDash val="solid"/>
+                      <a:round/>
+                      <a:headEnd type="none" w="sm" len="sm"/>
+                      <a:tailEnd type="none" w="sm" len="sm"/>
+                    </a:lnB>
+                    <a:solidFill>
+                      <a:schemeClr val="bg1"/>
+                    </a:solidFill>
+                  </a:tcPr>
+                </a:tc>
+                <a:tc hMerge="1">
+                  <a:txBody>
+                    <a:bodyPr/>
+                    <a:lstStyle/>
+                    <a:p>
+                      <a:pPr marL="0" marR="0" lvl="0" indent="0" algn="ctr" defTabSz="914400" rtl="0" eaLnBrk="1" fontAlgn="auto" latinLnBrk="0" hangingPunct="1">
+                        <a:lnSpc>
+                          <a:spcPct val="115000"/>
+                        </a:lnSpc>
+                        <a:spcBef>
+                          <a:spcPts val="0"/>
+                        </a:spcBef>
+                        <a:spcAft>
+                          <a:spcPts val="0"/>
+                        </a:spcAft>
+                        <a:buClr>
+                          <a:srgbClr val="000000"/>
+                        </a:buClr>
+                        <a:buSzTx/>
+                        <a:buFont typeface="Arial"/>
+                        <a:buNone/>
+                        <a:tabLst/>
+                        <a:defRPr/>
+                      </a:pPr>
+                      <a:endParaRPr lang="en-US" sz="1000" dirty="0">
+                        <a:solidFill>
+                          <a:schemeClr val="dk1"/>
+                        </a:solidFill>
+                        <a:latin typeface="Roboto"/>
+                        <a:ea typeface="Roboto"/>
+                        <a:cs typeface="Roboto"/>
+                        <a:sym typeface="Roboto"/>
+                      </a:endParaRPr>
+                    </a:p>
+                  </a:txBody>
+                  <a:tcPr marL="91425" marR="91425" marT="91425" marB="91425" anchor="ctr">
+                    <a:lnL w="12700" cap="flat" cmpd="sng" algn="ctr">
+                      <a:solidFill>
+                        <a:schemeClr val="tx1"/>
+                      </a:solidFill>
+                      <a:prstDash val="solid"/>
+                      <a:round/>
+                      <a:headEnd type="none" w="med" len="med"/>
+                      <a:tailEnd type="none" w="med" len="med"/>
+                    </a:lnL>
+                    <a:lnR w="12700" cap="flat" cmpd="sng" algn="ctr">
+                      <a:solidFill>
+                        <a:schemeClr val="tx1"/>
+                      </a:solidFill>
+                      <a:prstDash val="solid"/>
+                      <a:round/>
+                      <a:headEnd type="none" w="med" len="med"/>
+                      <a:tailEnd type="none" w="med" len="med"/>
+                    </a:lnR>
+                    <a:lnT w="9525" cap="flat" cmpd="sng">
+                      <a:solidFill>
+                        <a:srgbClr val="9E9E9E"/>
+                      </a:solidFill>
+                      <a:prstDash val="solid"/>
+                      <a:round/>
+                      <a:headEnd type="none" w="sm" len="sm"/>
+                      <a:tailEnd type="none" w="sm" len="sm"/>
+                    </a:lnT>
+                    <a:lnB w="9525" cap="flat" cmpd="sng" algn="ctr">
+                      <a:solidFill>
+                        <a:srgbClr val="9E9E9E"/>
+                      </a:solidFill>
+                      <a:prstDash val="solid"/>
+                      <a:round/>
+                      <a:headEnd type="none" w="sm" len="sm"/>
+                      <a:tailEnd type="none" w="sm" len="sm"/>
+                    </a:lnB>
+                    <a:solidFill>
+                      <a:srgbClr val="C9DAF8"/>
+                    </a:solidFill>
+                  </a:tcPr>
+                </a:tc>
+                <a:tc hMerge="1">
+                  <a:txBody>
+                    <a:bodyPr/>
+                    <a:lstStyle/>
+                    <a:p>
+                      <a:pPr marL="0" marR="0" lvl="0" indent="0" algn="ctr" defTabSz="914400" rtl="0" eaLnBrk="1" fontAlgn="auto" latinLnBrk="0" hangingPunct="1">
+                        <a:lnSpc>
+                          <a:spcPct val="115000"/>
+                        </a:lnSpc>
+                        <a:spcBef>
+                          <a:spcPts val="0"/>
+                        </a:spcBef>
+                        <a:spcAft>
+                          <a:spcPts val="0"/>
+                        </a:spcAft>
+                        <a:buClr>
+                          <a:srgbClr val="000000"/>
+                        </a:buClr>
+                        <a:buSzTx/>
+                        <a:buFont typeface="Arial"/>
+                        <a:buNone/>
+                        <a:tabLst/>
+                        <a:defRPr/>
+                      </a:pPr>
+                      <a:endParaRPr lang="en-US" sz="1000" dirty="0">
+                        <a:solidFill>
+                          <a:schemeClr val="dk1"/>
+                        </a:solidFill>
+                        <a:latin typeface="Roboto"/>
+                        <a:ea typeface="Roboto"/>
+                        <a:cs typeface="Roboto"/>
+                        <a:sym typeface="Roboto"/>
+                      </a:endParaRPr>
+                    </a:p>
+                  </a:txBody>
+                  <a:tcPr marL="91425" marR="91425" marT="91425" marB="91425" anchor="ctr">
+                    <a:lnL w="12700" cap="flat" cmpd="sng" algn="ctr">
+                      <a:solidFill>
+                        <a:schemeClr val="tx1"/>
+                      </a:solidFill>
+                      <a:prstDash val="solid"/>
+                      <a:round/>
+                      <a:headEnd type="none" w="med" len="med"/>
+                      <a:tailEnd type="none" w="med" len="med"/>
+                    </a:lnL>
+                    <a:lnR w="12700" cap="flat" cmpd="sng" algn="ctr">
+                      <a:solidFill>
+                        <a:schemeClr val="tx1"/>
+                      </a:solidFill>
+                      <a:prstDash val="solid"/>
+                      <a:round/>
+                      <a:headEnd type="none" w="med" len="med"/>
+                      <a:tailEnd type="none" w="med" len="med"/>
+                    </a:lnR>
+                    <a:lnT w="9525" cap="flat" cmpd="sng">
+                      <a:solidFill>
+                        <a:srgbClr val="9E9E9E"/>
+                      </a:solidFill>
+                      <a:prstDash val="solid"/>
+                      <a:round/>
+                      <a:headEnd type="none" w="sm" len="sm"/>
+                      <a:tailEnd type="none" w="sm" len="sm"/>
+                    </a:lnT>
+                    <a:lnB w="9525" cap="flat" cmpd="sng" algn="ctr">
+                      <a:solidFill>
+                        <a:srgbClr val="9E9E9E"/>
+                      </a:solidFill>
+                      <a:prstDash val="solid"/>
+                      <a:round/>
+                      <a:headEnd type="none" w="sm" len="sm"/>
+                      <a:tailEnd type="none" w="sm" len="sm"/>
+                    </a:lnB>
+                    <a:solidFill>
+                      <a:srgbClr val="C9DAF8"/>
+                    </a:solidFill>
+                  </a:tcPr>
+                </a:tc>
+                <a:tc gridSpan="4">
+                  <a:txBody>
+                    <a:bodyPr/>
+                    <a:lstStyle/>
+                    <a:p>
+                      <a:pPr marL="0" lvl="0" indent="0" algn="ctr" rtl="0">
+                        <a:lnSpc>
+                          <a:spcPct val="115000"/>
+                        </a:lnSpc>
+                        <a:spcBef>
+                          <a:spcPts val="0"/>
+                        </a:spcBef>
+                        <a:spcAft>
+                          <a:spcPts val="0"/>
+                        </a:spcAft>
+                        <a:buNone/>
+                      </a:pPr>
+                      <a:r>
+                        <a:rPr lang="pt-BR" sz="1000" dirty="0">
+                          <a:solidFill>
+                            <a:schemeClr val="dk1"/>
+                          </a:solidFill>
+                          <a:latin typeface="Roboto"/>
+                          <a:ea typeface="Roboto"/>
+                          <a:cs typeface="Roboto"/>
+                          <a:sym typeface="Roboto"/>
+                        </a:rPr>
+                        <a:t>Implementar Agendamento de consultas odontológicas</a:t>
+                      </a:r>
+                      <a:endParaRPr lang="pt-BR" sz="1000" dirty="0">
+                        <a:latin typeface="Roboto"/>
+                        <a:ea typeface="Roboto"/>
+                        <a:cs typeface="Roboto"/>
+                        <a:sym typeface="Roboto"/>
+                      </a:endParaRPr>
+                    </a:p>
+                  </a:txBody>
+                  <a:tcPr marL="91425" marR="91425" marT="91425" marB="91425" anchor="ctr">
+                    <a:lnL w="12700" cap="flat" cmpd="sng" algn="ctr">
+                      <a:solidFill>
+                        <a:schemeClr val="tx1"/>
+                      </a:solidFill>
+                      <a:prstDash val="solid"/>
+                      <a:round/>
+                      <a:headEnd type="none" w="med" len="med"/>
+                      <a:tailEnd type="none" w="med" len="med"/>
+                    </a:lnL>
+                    <a:lnR w="9525" cap="flat" cmpd="sng" algn="ctr">
+                      <a:solidFill>
+                        <a:srgbClr val="9E9E9E"/>
+                      </a:solidFill>
+                      <a:prstDash val="solid"/>
+                      <a:round/>
+                      <a:headEnd type="none" w="sm" len="sm"/>
+                      <a:tailEnd type="none" w="sm" len="sm"/>
+                    </a:lnR>
+                    <a:lnT w="9525" cap="flat" cmpd="sng">
+                      <a:solidFill>
+                        <a:srgbClr val="9E9E9E"/>
+                      </a:solidFill>
+                      <a:prstDash val="solid"/>
+                      <a:round/>
+                      <a:headEnd type="none" w="sm" len="sm"/>
+                      <a:tailEnd type="none" w="sm" len="sm"/>
+                    </a:lnT>
+                    <a:lnB w="9525" cap="flat" cmpd="sng" algn="ctr">
+                      <a:solidFill>
+                        <a:srgbClr val="9E9E9E"/>
+                      </a:solidFill>
+                      <a:prstDash val="solid"/>
+                      <a:round/>
+                      <a:headEnd type="none" w="sm" len="sm"/>
+                      <a:tailEnd type="none" w="sm" len="sm"/>
+                    </a:lnB>
+                    <a:solidFill>
+                      <a:schemeClr val="bg2">
+                        <a:lumMod val="60000"/>
+                        <a:lumOff val="40000"/>
+                      </a:schemeClr>
+                    </a:solidFill>
+                  </a:tcPr>
+                </a:tc>
+                <a:tc hMerge="1">
+                  <a:txBody>
+                    <a:bodyPr/>
+                    <a:lstStyle/>
+                    <a:p>
+                      <a:pPr marL="0" marR="0" lvl="0" indent="0" algn="ctr" defTabSz="914400" rtl="0" eaLnBrk="1" fontAlgn="auto" latinLnBrk="0" hangingPunct="1">
+                        <a:lnSpc>
+                          <a:spcPct val="115000"/>
+                        </a:lnSpc>
+                        <a:spcBef>
+                          <a:spcPts val="0"/>
+                        </a:spcBef>
+                        <a:spcAft>
+                          <a:spcPts val="0"/>
+                        </a:spcAft>
+                        <a:buClr>
+                          <a:srgbClr val="000000"/>
+                        </a:buClr>
+                        <a:buSzTx/>
+                        <a:buFont typeface="Arial"/>
+                        <a:buNone/>
+                        <a:tabLst/>
+                        <a:defRPr/>
+                      </a:pPr>
+                      <a:endParaRPr lang="pt-BR" sz="1000" dirty="0">
+                        <a:latin typeface="Roboto"/>
+                        <a:ea typeface="Roboto"/>
+                        <a:cs typeface="Roboto"/>
+                        <a:sym typeface="Roboto"/>
+                      </a:endParaRPr>
+                    </a:p>
+                  </a:txBody>
+                  <a:tcPr marL="91425" marR="91425" marT="91425" marB="91425" anchor="ctr">
+                    <a:lnL w="12700" cap="flat" cmpd="sng" algn="ctr">
+                      <a:solidFill>
+                        <a:schemeClr val="tx1"/>
+                      </a:solidFill>
+                      <a:prstDash val="solid"/>
+                      <a:round/>
+                      <a:headEnd type="none" w="med" len="med"/>
+                      <a:tailEnd type="none" w="med" len="med"/>
+                    </a:lnL>
+                    <a:lnR w="9525" cap="flat" cmpd="sng" algn="ctr">
+                      <a:solidFill>
+                        <a:srgbClr val="9E9E9E"/>
+                      </a:solidFill>
+                      <a:prstDash val="solid"/>
+                      <a:round/>
+                      <a:headEnd type="none" w="sm" len="sm"/>
+                      <a:tailEnd type="none" w="sm" len="sm"/>
+                    </a:lnR>
+                    <a:lnT w="9525" cap="flat" cmpd="sng">
+                      <a:solidFill>
+                        <a:srgbClr val="9E9E9E"/>
+                      </a:solidFill>
+                      <a:prstDash val="solid"/>
+                      <a:round/>
+                      <a:headEnd type="none" w="sm" len="sm"/>
+                      <a:tailEnd type="none" w="sm" len="sm"/>
+                    </a:lnT>
+                    <a:lnB w="9525" cap="flat" cmpd="sng" algn="ctr">
+                      <a:solidFill>
+                        <a:srgbClr val="9E9E9E"/>
+                      </a:solidFill>
+                      <a:prstDash val="solid"/>
+                      <a:round/>
+                      <a:headEnd type="none" w="sm" len="sm"/>
+                      <a:tailEnd type="none" w="sm" len="sm"/>
+                    </a:lnB>
+                    <a:solidFill>
+                      <a:srgbClr val="C9DAF8"/>
+                    </a:solidFill>
+                  </a:tcPr>
+                </a:tc>
+                <a:tc hMerge="1">
+                  <a:txBody>
+                    <a:bodyPr/>
+                    <a:lstStyle/>
+                    <a:p>
+                      <a:pPr marL="0" marR="0" lvl="0" indent="0" algn="ctr" defTabSz="914400" rtl="0" eaLnBrk="1" fontAlgn="auto" latinLnBrk="0" hangingPunct="1">
+                        <a:lnSpc>
+                          <a:spcPct val="115000"/>
+                        </a:lnSpc>
+                        <a:spcBef>
+                          <a:spcPts val="0"/>
+                        </a:spcBef>
+                        <a:spcAft>
+                          <a:spcPts val="0"/>
+                        </a:spcAft>
+                        <a:buClr>
+                          <a:srgbClr val="000000"/>
+                        </a:buClr>
+                        <a:buSzTx/>
+                        <a:buFont typeface="Arial"/>
+                        <a:buNone/>
+                        <a:tabLst/>
+                        <a:defRPr/>
+                      </a:pPr>
+                      <a:endParaRPr lang="en-US" sz="1000" dirty="0"/>
+                    </a:p>
+                  </a:txBody>
+                  <a:tcPr marL="91425" marR="91425" marT="91425" marB="91425" anchor="ctr">
+                    <a:lnL w="12700" cap="flat" cmpd="sng" algn="ctr">
+                      <a:solidFill>
+                        <a:schemeClr val="tx1"/>
+                      </a:solidFill>
+                      <a:prstDash val="solid"/>
+                      <a:round/>
+                      <a:headEnd type="none" w="med" len="med"/>
+                      <a:tailEnd type="none" w="med" len="med"/>
+                    </a:lnL>
+                    <a:lnR w="9525" cap="flat" cmpd="sng" algn="ctr">
+                      <a:solidFill>
+                        <a:srgbClr val="9E9E9E"/>
+                      </a:solidFill>
+                      <a:prstDash val="solid"/>
+                      <a:round/>
+                      <a:headEnd type="none" w="sm" len="sm"/>
+                      <a:tailEnd type="none" w="sm" len="sm"/>
+                    </a:lnR>
+                    <a:lnT w="9525" cap="flat" cmpd="sng">
+                      <a:solidFill>
+                        <a:srgbClr val="9E9E9E"/>
+                      </a:solidFill>
+                      <a:prstDash val="solid"/>
+                      <a:round/>
+                      <a:headEnd type="none" w="sm" len="sm"/>
+                      <a:tailEnd type="none" w="sm" len="sm"/>
+                    </a:lnT>
+                    <a:lnB w="9525" cap="flat" cmpd="sng" algn="ctr">
+                      <a:noFill/>
+                      <a:prstDash val="solid"/>
+                      <a:round/>
+                      <a:headEnd type="none" w="sm" len="sm"/>
+                      <a:tailEnd type="none" w="sm" len="sm"/>
+                    </a:lnB>
+                    <a:solidFill>
+                      <a:srgbClr val="C9DAF8"/>
+                    </a:solidFill>
+                  </a:tcPr>
+                </a:tc>
+                <a:tc hMerge="1">
+                  <a:txBody>
+                    <a:bodyPr/>
+                    <a:lstStyle/>
+                    <a:p>
+                      <a:pPr marL="0" lvl="0" indent="0" algn="ctr" rtl="0">
+                        <a:lnSpc>
+                          <a:spcPct val="115000"/>
+                        </a:lnSpc>
+                        <a:spcBef>
+                          <a:spcPts val="0"/>
+                        </a:spcBef>
+                        <a:spcAft>
+                          <a:spcPts val="0"/>
+                        </a:spcAft>
+                        <a:buClr>
+                          <a:schemeClr val="dk1"/>
+                        </a:buClr>
+                        <a:buSzPts val="1100"/>
+                        <a:buFont typeface="Arial"/>
+                        <a:buNone/>
+                      </a:pPr>
+                      <a:endParaRPr dirty="0"/>
+                    </a:p>
+                  </a:txBody>
+                  <a:tcPr marL="91425" marR="91425" marT="91425" marB="91425" anchor="ctr">
+                    <a:lnL w="9525" cap="flat" cmpd="sng">
+                      <a:noFill/>
+                      <a:prstDash val="solid"/>
+                      <a:round/>
+                      <a:headEnd type="none" w="sm" len="sm"/>
+                      <a:tailEnd type="none" w="sm" len="sm"/>
+                    </a:lnL>
+                    <a:lnR w="9525" cap="flat" cmpd="sng" algn="ctr">
+                      <a:solidFill>
+                        <a:srgbClr val="9E9E9E"/>
+                      </a:solidFill>
+                      <a:prstDash val="solid"/>
+                      <a:round/>
+                      <a:headEnd type="none" w="sm" len="sm"/>
+                      <a:tailEnd type="none" w="sm" len="sm"/>
+                    </a:lnR>
+                    <a:lnT w="9525" cap="flat" cmpd="sng">
+                      <a:solidFill>
+                        <a:srgbClr val="9E9E9E"/>
+                      </a:solidFill>
+                      <a:prstDash val="solid"/>
+                      <a:round/>
+                      <a:headEnd type="none" w="sm" len="sm"/>
+                      <a:tailEnd type="none" w="sm" len="sm"/>
+                    </a:lnT>
+                    <a:lnB w="9525" cap="flat" cmpd="sng" algn="ctr">
+                      <a:solidFill>
+                        <a:srgbClr val="9E9E9E"/>
+                      </a:solidFill>
+                      <a:prstDash val="solid"/>
+                      <a:round/>
+                      <a:headEnd type="none" w="sm" len="sm"/>
+                      <a:tailEnd type="none" w="sm" len="sm"/>
+                    </a:lnB>
+                    <a:solidFill>
+                      <a:srgbClr val="FFFFFF"/>
+                    </a:solidFill>
+                  </a:tcPr>
+                </a:tc>
+                <a:extLst>
+                  <a:ext uri="{0D108BD9-81ED-4DB2-BD59-A6C34878D82A}">
+                    <a16:rowId xmlns:a16="http://schemas.microsoft.com/office/drawing/2014/main" val="10004"/>
+                  </a:ext>
+                </a:extLst>
+              </a:tr>
+            </a:tbl>
+          </a:graphicData>
+        </a:graphic>
+      </p:graphicFrame>
+      <p:graphicFrame>
+        <p:nvGraphicFramePr>
+          <p:cNvPr id="2" name="Tabela 1">
+            <a:extLst>
+              <a:ext uri="{FF2B5EF4-FFF2-40B4-BE49-F238E27FC236}">
+                <a16:creationId xmlns:a16="http://schemas.microsoft.com/office/drawing/2014/main" id="{BE351F0F-577C-4C17-85C8-C3EDC2945E6B}"/>
+              </a:ext>
+            </a:extLst>
+          </p:cNvPr>
+          <p:cNvGraphicFramePr>
+            <a:graphicFrameLocks noGrp="1"/>
+          </p:cNvGraphicFramePr>
+          <p:nvPr>
+            <p:extLst>
+              <p:ext uri="{D42A27DB-BD31-4B8C-83A1-F6EECF244321}">
+                <p14:modId xmlns:p14="http://schemas.microsoft.com/office/powerpoint/2010/main" val="2557338450"/>
+              </p:ext>
+            </p:extLst>
+          </p:nvPr>
+        </p:nvGraphicFramePr>
+        <p:xfrm>
+          <a:off x="654755" y="4786490"/>
+          <a:ext cx="8279884" cy="2035790"/>
+        </p:xfrm>
+        <a:graphic>
+          <a:graphicData uri="http://schemas.openxmlformats.org/drawingml/2006/table">
+            <a:tbl>
+              <a:tblPr>
+                <a:noFill/>
+                <a:tableStyleId>{557AF7DA-715C-43BD-B663-7573096DC819}</a:tableStyleId>
+              </a:tblPr>
+              <a:tblGrid>
+                <a:gridCol w="1162102">
+                  <a:extLst>
+                    <a:ext uri="{9D8B030D-6E8A-4147-A177-3AD203B41FA5}">
+                      <a16:colId xmlns:a16="http://schemas.microsoft.com/office/drawing/2014/main" val="3852269391"/>
+                    </a:ext>
+                  </a:extLst>
+                </a:gridCol>
+                <a:gridCol w="1186297">
+                  <a:extLst>
+                    <a:ext uri="{9D8B030D-6E8A-4147-A177-3AD203B41FA5}">
+                      <a16:colId xmlns:a16="http://schemas.microsoft.com/office/drawing/2014/main" val="1885513302"/>
+                    </a:ext>
+                  </a:extLst>
+                </a:gridCol>
+                <a:gridCol w="1186297">
+                  <a:extLst>
+                    <a:ext uri="{9D8B030D-6E8A-4147-A177-3AD203B41FA5}">
+                      <a16:colId xmlns:a16="http://schemas.microsoft.com/office/drawing/2014/main" val="2058796260"/>
+                    </a:ext>
+                  </a:extLst>
+                </a:gridCol>
+                <a:gridCol w="1186297">
+                  <a:extLst>
+                    <a:ext uri="{9D8B030D-6E8A-4147-A177-3AD203B41FA5}">
+                      <a16:colId xmlns:a16="http://schemas.microsoft.com/office/drawing/2014/main" val="2097554712"/>
+                    </a:ext>
+                  </a:extLst>
+                </a:gridCol>
+                <a:gridCol w="1186297">
+                  <a:extLst>
+                    <a:ext uri="{9D8B030D-6E8A-4147-A177-3AD203B41FA5}">
+                      <a16:colId xmlns:a16="http://schemas.microsoft.com/office/drawing/2014/main" val="101022474"/>
+                    </a:ext>
+                  </a:extLst>
+                </a:gridCol>
+                <a:gridCol w="1186297">
+                  <a:extLst>
+                    <a:ext uri="{9D8B030D-6E8A-4147-A177-3AD203B41FA5}">
+                      <a16:colId xmlns:a16="http://schemas.microsoft.com/office/drawing/2014/main" val="2768034916"/>
+                    </a:ext>
+                  </a:extLst>
+                </a:gridCol>
+                <a:gridCol w="1186297">
+                  <a:extLst>
+                    <a:ext uri="{9D8B030D-6E8A-4147-A177-3AD203B41FA5}">
+                      <a16:colId xmlns:a16="http://schemas.microsoft.com/office/drawing/2014/main" val="422433162"/>
+                    </a:ext>
+                  </a:extLst>
+                </a:gridCol>
+              </a:tblGrid>
+              <a:tr h="353849">
+                <a:tc>
+                  <a:txBody>
+                    <a:bodyPr/>
+                    <a:lstStyle/>
+                    <a:p>
+                      <a:pPr marL="0" lvl="0" indent="0" algn="l" rtl="0">
+                        <a:spcBef>
+                          <a:spcPts val="0"/>
+                        </a:spcBef>
+                        <a:spcAft>
+                          <a:spcPts val="0"/>
+                        </a:spcAft>
+                        <a:buNone/>
+                      </a:pPr>
+                      <a:r>
+                        <a:rPr lang="en-US" sz="1100" b="1" dirty="0" err="1">
+                          <a:solidFill>
+                            <a:srgbClr val="FFFFFF"/>
+                          </a:solidFill>
+                          <a:latin typeface="Roboto"/>
+                          <a:ea typeface="Roboto"/>
+                          <a:cs typeface="Roboto"/>
+                          <a:sym typeface="Roboto"/>
+                        </a:rPr>
+                        <a:t>Dia</a:t>
+                      </a:r>
+                      <a:r>
+                        <a:rPr lang="en-US" sz="1100" b="1" dirty="0">
+                          <a:solidFill>
+                            <a:srgbClr val="FFFFFF"/>
+                          </a:solidFill>
+                          <a:latin typeface="Roboto"/>
+                          <a:ea typeface="Roboto"/>
+                          <a:cs typeface="Roboto"/>
+                          <a:sym typeface="Roboto"/>
+                        </a:rPr>
+                        <a:t> 15 </a:t>
+                      </a:r>
+                      <a:r>
+                        <a:rPr lang="en-US" sz="1000" dirty="0">
+                          <a:solidFill>
+                            <a:srgbClr val="FFFFFF"/>
+                          </a:solidFill>
+                          <a:latin typeface="Roboto"/>
+                          <a:ea typeface="Roboto"/>
+                          <a:cs typeface="Roboto"/>
+                          <a:sym typeface="Roboto"/>
+                        </a:rPr>
+                        <a:t>(26/04)</a:t>
+                      </a:r>
+                      <a:endParaRPr sz="1000" dirty="0">
+                        <a:solidFill>
+                          <a:srgbClr val="FFFFFF"/>
+                        </a:solidFill>
+                        <a:latin typeface="Roboto"/>
+                        <a:ea typeface="Roboto"/>
+                        <a:cs typeface="Roboto"/>
+                        <a:sym typeface="Roboto"/>
+                      </a:endParaRPr>
+                    </a:p>
+                  </a:txBody>
+                  <a:tcPr marL="91425" marR="91425" marT="91425" marB="91425">
+                    <a:lnL w="9525" cap="flat" cmpd="sng">
+                      <a:solidFill>
+                        <a:srgbClr val="9E9E9E"/>
+                      </a:solidFill>
+                      <a:prstDash val="solid"/>
+                      <a:round/>
+                      <a:headEnd type="none" w="sm" len="sm"/>
+                      <a:tailEnd type="none" w="sm" len="sm"/>
+                    </a:lnL>
+                    <a:lnR w="12700" cap="flat" cmpd="sng" algn="ctr">
+                      <a:solidFill>
+                        <a:schemeClr val="tx1"/>
+                      </a:solidFill>
+                      <a:prstDash val="solid"/>
+                      <a:round/>
+                      <a:headEnd type="none" w="med" len="med"/>
+                      <a:tailEnd type="none" w="med" len="med"/>
+                    </a:lnR>
+                    <a:lnT w="9525" cap="flat" cmpd="sng" algn="ctr">
+                      <a:solidFill>
+                        <a:srgbClr val="9E9E9E"/>
+                      </a:solidFill>
+                      <a:prstDash val="solid"/>
+                      <a:round/>
+                      <a:headEnd type="none" w="sm" len="sm"/>
+                      <a:tailEnd type="none" w="sm" len="sm"/>
+                    </a:lnT>
+                    <a:lnB w="9525" cap="flat" cmpd="sng">
+                      <a:solidFill>
+                        <a:srgbClr val="9E9E9E"/>
+                      </a:solidFill>
+                      <a:prstDash val="solid"/>
+                      <a:round/>
+                      <a:headEnd type="none" w="sm" len="sm"/>
+                      <a:tailEnd type="none" w="sm" len="sm"/>
+                    </a:lnB>
+                    <a:solidFill>
+                      <a:srgbClr val="052A4D"/>
+                    </a:solidFill>
+                  </a:tcPr>
+                </a:tc>
+                <a:tc>
+                  <a:txBody>
+                    <a:bodyPr/>
+                    <a:lstStyle/>
+                    <a:p>
+                      <a:pPr marL="0" lvl="0" indent="0" algn="l" rtl="0">
+                        <a:spcBef>
+                          <a:spcPts val="0"/>
+                        </a:spcBef>
+                        <a:spcAft>
+                          <a:spcPts val="0"/>
+                        </a:spcAft>
+                        <a:buNone/>
+                      </a:pPr>
+                      <a:r>
+                        <a:rPr lang="en-US" sz="1100" b="1" dirty="0" err="1">
+                          <a:solidFill>
+                            <a:srgbClr val="FFFFFF"/>
+                          </a:solidFill>
+                          <a:latin typeface="Roboto"/>
+                          <a:ea typeface="Roboto"/>
+                          <a:cs typeface="Roboto"/>
+                          <a:sym typeface="Roboto"/>
+                        </a:rPr>
+                        <a:t>Dia</a:t>
+                      </a:r>
+                      <a:r>
+                        <a:rPr lang="en-US" sz="1100" b="1" dirty="0">
+                          <a:solidFill>
+                            <a:srgbClr val="FFFFFF"/>
+                          </a:solidFill>
+                          <a:latin typeface="Roboto"/>
+                          <a:ea typeface="Roboto"/>
+                          <a:cs typeface="Roboto"/>
+                          <a:sym typeface="Roboto"/>
+                        </a:rPr>
+                        <a:t> 16 </a:t>
+                      </a:r>
+                      <a:r>
+                        <a:rPr lang="en-US" sz="1000" dirty="0">
+                          <a:solidFill>
+                            <a:srgbClr val="FFFFFF"/>
+                          </a:solidFill>
+                          <a:latin typeface="Roboto"/>
+                          <a:ea typeface="Roboto"/>
+                          <a:cs typeface="Roboto"/>
+                          <a:sym typeface="Roboto"/>
+                        </a:rPr>
+                        <a:t>(27/04)</a:t>
+                      </a:r>
+                      <a:endParaRPr dirty="0">
+                        <a:latin typeface="Roboto"/>
+                        <a:ea typeface="Roboto"/>
+                        <a:cs typeface="Roboto"/>
+                        <a:sym typeface="Roboto"/>
+                      </a:endParaRPr>
+                    </a:p>
+                  </a:txBody>
+                  <a:tcPr marL="91425" marR="91425" marT="91425" marB="91425">
+                    <a:lnL w="12700" cap="flat" cmpd="sng" algn="ctr">
+                      <a:solidFill>
+                        <a:schemeClr val="tx1"/>
+                      </a:solidFill>
+                      <a:prstDash val="solid"/>
+                      <a:round/>
+                      <a:headEnd type="none" w="med" len="med"/>
+                      <a:tailEnd type="none" w="med" len="med"/>
+                    </a:lnL>
+                    <a:lnR w="12700" cap="flat" cmpd="sng" algn="ctr">
+                      <a:solidFill>
+                        <a:schemeClr val="tx1"/>
+                      </a:solidFill>
+                      <a:prstDash val="solid"/>
+                      <a:round/>
+                      <a:headEnd type="none" w="med" len="med"/>
+                      <a:tailEnd type="none" w="med" len="med"/>
+                    </a:lnR>
+                    <a:lnT w="9525" cap="flat" cmpd="sng" algn="ctr">
+                      <a:solidFill>
+                        <a:srgbClr val="9E9E9E"/>
+                      </a:solidFill>
+                      <a:prstDash val="solid"/>
+                      <a:round/>
+                      <a:headEnd type="none" w="sm" len="sm"/>
+                      <a:tailEnd type="none" w="sm" len="sm"/>
+                    </a:lnT>
+                    <a:lnB w="9525" cap="flat" cmpd="sng">
+                      <a:solidFill>
+                        <a:srgbClr val="9E9E9E"/>
+                      </a:solidFill>
+                      <a:prstDash val="solid"/>
+                      <a:round/>
+                      <a:headEnd type="none" w="sm" len="sm"/>
+                      <a:tailEnd type="none" w="sm" len="sm"/>
+                    </a:lnB>
+                    <a:solidFill>
+                      <a:srgbClr val="052A4D"/>
+                    </a:solidFill>
+                  </a:tcPr>
+                </a:tc>
+                <a:tc>
+                  <a:txBody>
+                    <a:bodyPr/>
+                    <a:lstStyle/>
+                    <a:p>
+                      <a:pPr marL="0" lvl="0" indent="0" algn="l" rtl="0">
+                        <a:spcBef>
+                          <a:spcPts val="0"/>
+                        </a:spcBef>
+                        <a:spcAft>
+                          <a:spcPts val="0"/>
+                        </a:spcAft>
+                        <a:buNone/>
+                      </a:pPr>
+                      <a:r>
+                        <a:rPr lang="en-US" sz="1100" b="1" dirty="0" err="1">
+                          <a:solidFill>
+                            <a:srgbClr val="FFFFFF"/>
+                          </a:solidFill>
+                          <a:latin typeface="Roboto"/>
+                          <a:ea typeface="Roboto"/>
+                          <a:cs typeface="Roboto"/>
+                          <a:sym typeface="Roboto"/>
+                        </a:rPr>
+                        <a:t>Dia</a:t>
+                      </a:r>
+                      <a:r>
+                        <a:rPr lang="en-US" sz="1100" b="1" dirty="0">
+                          <a:solidFill>
+                            <a:srgbClr val="FFFFFF"/>
+                          </a:solidFill>
+                          <a:latin typeface="Roboto"/>
+                          <a:ea typeface="Roboto"/>
+                          <a:cs typeface="Roboto"/>
+                          <a:sym typeface="Roboto"/>
+                        </a:rPr>
+                        <a:t> 17 </a:t>
+                      </a:r>
+                      <a:r>
+                        <a:rPr lang="en-US" sz="1000" dirty="0">
+                          <a:solidFill>
+                            <a:srgbClr val="FFFFFF"/>
+                          </a:solidFill>
+                          <a:latin typeface="Roboto"/>
+                          <a:ea typeface="Roboto"/>
+                          <a:cs typeface="Roboto"/>
+                          <a:sym typeface="Roboto"/>
+                        </a:rPr>
+                        <a:t>(28/04)</a:t>
+                      </a:r>
+                      <a:endParaRPr dirty="0">
+                        <a:latin typeface="Roboto"/>
+                        <a:ea typeface="Roboto"/>
+                        <a:cs typeface="Roboto"/>
+                        <a:sym typeface="Roboto"/>
+                      </a:endParaRPr>
+                    </a:p>
+                  </a:txBody>
+                  <a:tcPr marL="91425" marR="91425" marT="91425" marB="91425">
+                    <a:lnL w="12700" cap="flat" cmpd="sng" algn="ctr">
+                      <a:solidFill>
+                        <a:schemeClr val="tx1"/>
+                      </a:solidFill>
+                      <a:prstDash val="solid"/>
+                      <a:round/>
+                      <a:headEnd type="none" w="med" len="med"/>
+                      <a:tailEnd type="none" w="med" len="med"/>
+                    </a:lnL>
+                    <a:lnR w="9525" cap="flat" cmpd="sng" algn="ctr">
+                      <a:solidFill>
+                        <a:srgbClr val="9E9E9E"/>
+                      </a:solidFill>
+                      <a:prstDash val="solid"/>
+                      <a:round/>
+                      <a:headEnd type="none" w="sm" len="sm"/>
+                      <a:tailEnd type="none" w="sm" len="sm"/>
+                    </a:lnR>
+                    <a:lnT w="9525" cap="flat" cmpd="sng" algn="ctr">
+                      <a:solidFill>
+                        <a:srgbClr val="9E9E9E"/>
+                      </a:solidFill>
+                      <a:prstDash val="solid"/>
+                      <a:round/>
+                      <a:headEnd type="none" w="sm" len="sm"/>
+                      <a:tailEnd type="none" w="sm" len="sm"/>
+                    </a:lnT>
+                    <a:lnB w="9525" cap="flat" cmpd="sng">
+                      <a:solidFill>
+                        <a:srgbClr val="9E9E9E"/>
+                      </a:solidFill>
+                      <a:prstDash val="solid"/>
+                      <a:round/>
+                      <a:headEnd type="none" w="sm" len="sm"/>
+                      <a:tailEnd type="none" w="sm" len="sm"/>
+                    </a:lnB>
+                    <a:solidFill>
+                      <a:srgbClr val="052A4D"/>
+                    </a:solidFill>
+                  </a:tcPr>
+                </a:tc>
+                <a:tc>
+                  <a:txBody>
+                    <a:bodyPr/>
+                    <a:lstStyle/>
+                    <a:p>
+                      <a:pPr marL="0" lvl="0" indent="0" algn="l" rtl="0">
+                        <a:spcBef>
+                          <a:spcPts val="0"/>
+                        </a:spcBef>
+                        <a:spcAft>
+                          <a:spcPts val="0"/>
+                        </a:spcAft>
+                        <a:buNone/>
+                      </a:pPr>
+                      <a:r>
+                        <a:rPr lang="en-US" sz="1100" b="1" dirty="0" err="1">
+                          <a:solidFill>
+                            <a:srgbClr val="FFFFFF"/>
+                          </a:solidFill>
+                          <a:latin typeface="Roboto"/>
+                          <a:ea typeface="Roboto"/>
+                          <a:cs typeface="Roboto"/>
+                          <a:sym typeface="Roboto"/>
+                        </a:rPr>
+                        <a:t>Dia</a:t>
+                      </a:r>
+                      <a:r>
+                        <a:rPr lang="en-US" sz="1100" b="1" dirty="0">
+                          <a:solidFill>
+                            <a:srgbClr val="FFFFFF"/>
+                          </a:solidFill>
+                          <a:latin typeface="Roboto"/>
+                          <a:ea typeface="Roboto"/>
+                          <a:cs typeface="Roboto"/>
+                          <a:sym typeface="Roboto"/>
+                        </a:rPr>
+                        <a:t> 18 </a:t>
+                      </a:r>
+                      <a:r>
+                        <a:rPr lang="en-US" sz="1000" dirty="0">
+                          <a:solidFill>
+                            <a:srgbClr val="FFFFFF"/>
+                          </a:solidFill>
+                          <a:latin typeface="Roboto"/>
+                          <a:ea typeface="Roboto"/>
+                          <a:cs typeface="Roboto"/>
+                          <a:sym typeface="Roboto"/>
+                        </a:rPr>
+                        <a:t>(29/04)</a:t>
+                      </a:r>
+                      <a:endParaRPr dirty="0">
+                        <a:latin typeface="Roboto"/>
+                        <a:ea typeface="Roboto"/>
+                        <a:cs typeface="Roboto"/>
+                        <a:sym typeface="Roboto"/>
+                      </a:endParaRPr>
+                    </a:p>
+                  </a:txBody>
+                  <a:tcPr marL="91425" marR="91425" marT="91425" marB="91425">
+                    <a:lnL w="9525" cap="flat" cmpd="sng" algn="ctr">
+                      <a:solidFill>
+                        <a:srgbClr val="9E9E9E"/>
+                      </a:solidFill>
+                      <a:prstDash val="solid"/>
+                      <a:round/>
+                      <a:headEnd type="none" w="sm" len="sm"/>
+                      <a:tailEnd type="none" w="sm" len="sm"/>
+                    </a:lnL>
+                    <a:lnR w="12700" cap="flat" cmpd="sng" algn="ctr">
+                      <a:solidFill>
+                        <a:schemeClr val="tx1"/>
+                      </a:solidFill>
+                      <a:prstDash val="solid"/>
+                      <a:round/>
+                      <a:headEnd type="none" w="med" len="med"/>
+                      <a:tailEnd type="none" w="med" len="med"/>
+                    </a:lnR>
+                    <a:lnT w="9525" cap="flat" cmpd="sng">
+                      <a:solidFill>
+                        <a:srgbClr val="9E9E9E"/>
+                      </a:solidFill>
+                      <a:prstDash val="solid"/>
+                      <a:round/>
+                      <a:headEnd type="none" w="sm" len="sm"/>
+                      <a:tailEnd type="none" w="sm" len="sm"/>
+                    </a:lnT>
+                    <a:lnB w="9525" cap="flat" cmpd="sng">
+                      <a:solidFill>
+                        <a:srgbClr val="9E9E9E"/>
+                      </a:solidFill>
+                      <a:prstDash val="solid"/>
+                      <a:round/>
+                      <a:headEnd type="none" w="sm" len="sm"/>
+                      <a:tailEnd type="none" w="sm" len="sm"/>
+                    </a:lnB>
+                    <a:solidFill>
+                      <a:srgbClr val="052A4D"/>
+                    </a:solidFill>
+                  </a:tcPr>
+                </a:tc>
+                <a:tc>
+                  <a:txBody>
+                    <a:bodyPr/>
+                    <a:lstStyle/>
+                    <a:p>
+                      <a:pPr marL="0" lvl="0" indent="0" algn="l" rtl="0">
+                        <a:spcBef>
+                          <a:spcPts val="0"/>
+                        </a:spcBef>
+                        <a:spcAft>
+                          <a:spcPts val="0"/>
+                        </a:spcAft>
+                        <a:buNone/>
+                      </a:pPr>
+                      <a:r>
+                        <a:rPr lang="en-US" sz="1100" b="1" dirty="0" err="1">
+                          <a:solidFill>
+                            <a:srgbClr val="FFFFFF"/>
+                          </a:solidFill>
+                          <a:latin typeface="Roboto"/>
+                          <a:ea typeface="Roboto"/>
+                          <a:cs typeface="Roboto"/>
+                          <a:sym typeface="Roboto"/>
+                        </a:rPr>
+                        <a:t>Dia</a:t>
+                      </a:r>
+                      <a:r>
+                        <a:rPr lang="en-US" sz="1100" b="1" dirty="0">
+                          <a:solidFill>
+                            <a:srgbClr val="FFFFFF"/>
+                          </a:solidFill>
+                          <a:latin typeface="Roboto"/>
+                          <a:ea typeface="Roboto"/>
+                          <a:cs typeface="Roboto"/>
+                          <a:sym typeface="Roboto"/>
+                        </a:rPr>
+                        <a:t> 19 </a:t>
+                      </a:r>
+                      <a:r>
+                        <a:rPr lang="en-US" sz="1000" dirty="0">
+                          <a:solidFill>
+                            <a:srgbClr val="FFFFFF"/>
+                          </a:solidFill>
+                          <a:latin typeface="Roboto"/>
+                          <a:ea typeface="Roboto"/>
+                          <a:cs typeface="Roboto"/>
+                          <a:sym typeface="Roboto"/>
+                        </a:rPr>
+                        <a:t>(30/04)</a:t>
+                      </a:r>
+                      <a:endParaRPr dirty="0">
+                        <a:latin typeface="Roboto"/>
+                        <a:ea typeface="Roboto"/>
+                        <a:cs typeface="Roboto"/>
+                        <a:sym typeface="Roboto"/>
+                      </a:endParaRPr>
+                    </a:p>
+                  </a:txBody>
+                  <a:tcPr marL="91425" marR="91425" marT="91425" marB="91425">
+                    <a:lnL w="12700" cap="flat" cmpd="sng" algn="ctr">
+                      <a:solidFill>
+                        <a:schemeClr val="tx1"/>
+                      </a:solidFill>
+                      <a:prstDash val="solid"/>
+                      <a:round/>
+                      <a:headEnd type="none" w="med" len="med"/>
+                      <a:tailEnd type="none" w="med" len="med"/>
+                    </a:lnL>
+                    <a:lnR w="12700" cap="flat" cmpd="sng" algn="ctr">
+                      <a:solidFill>
+                        <a:schemeClr val="tx1"/>
+                      </a:solidFill>
+                      <a:prstDash val="solid"/>
+                      <a:round/>
+                      <a:headEnd type="none" w="med" len="med"/>
+                      <a:tailEnd type="none" w="med" len="med"/>
+                    </a:lnR>
+                    <a:lnT w="9525" cap="flat" cmpd="sng">
+                      <a:solidFill>
+                        <a:srgbClr val="9E9E9E"/>
+                      </a:solidFill>
+                      <a:prstDash val="solid"/>
+                      <a:round/>
+                      <a:headEnd type="none" w="sm" len="sm"/>
+                      <a:tailEnd type="none" w="sm" len="sm"/>
+                    </a:lnT>
+                    <a:lnB w="9525" cap="flat" cmpd="sng">
+                      <a:solidFill>
+                        <a:srgbClr val="9E9E9E"/>
+                      </a:solidFill>
+                      <a:prstDash val="solid"/>
+                      <a:round/>
+                      <a:headEnd type="none" w="sm" len="sm"/>
+                      <a:tailEnd type="none" w="sm" len="sm"/>
+                    </a:lnB>
+                    <a:solidFill>
+                      <a:srgbClr val="052A4D"/>
+                    </a:solidFill>
+                  </a:tcPr>
+                </a:tc>
+                <a:tc>
+                  <a:txBody>
+                    <a:bodyPr/>
+                    <a:lstStyle/>
+                    <a:p>
+                      <a:pPr marL="0" lvl="0" indent="0" algn="l" rtl="0">
+                        <a:spcBef>
+                          <a:spcPts val="0"/>
+                        </a:spcBef>
+                        <a:spcAft>
+                          <a:spcPts val="0"/>
+                        </a:spcAft>
+                        <a:buNone/>
+                      </a:pPr>
+                      <a:r>
+                        <a:rPr lang="en-US" sz="1100" b="1" dirty="0" err="1">
+                          <a:solidFill>
+                            <a:srgbClr val="FFFFFF"/>
+                          </a:solidFill>
+                          <a:latin typeface="Roboto"/>
+                          <a:ea typeface="Roboto"/>
+                          <a:cs typeface="Roboto"/>
+                          <a:sym typeface="Roboto"/>
+                        </a:rPr>
+                        <a:t>Dia</a:t>
+                      </a:r>
+                      <a:r>
+                        <a:rPr lang="en-US" sz="1100" b="1" dirty="0">
+                          <a:solidFill>
+                            <a:srgbClr val="FFFFFF"/>
+                          </a:solidFill>
+                          <a:latin typeface="Roboto"/>
+                          <a:ea typeface="Roboto"/>
+                          <a:cs typeface="Roboto"/>
+                          <a:sym typeface="Roboto"/>
+                        </a:rPr>
+                        <a:t> 20 </a:t>
+                      </a:r>
+                      <a:r>
+                        <a:rPr lang="en-US" sz="1000" dirty="0">
+                          <a:solidFill>
+                            <a:srgbClr val="FFFFFF"/>
+                          </a:solidFill>
+                          <a:latin typeface="Roboto"/>
+                          <a:ea typeface="Roboto"/>
+                          <a:cs typeface="Roboto"/>
+                          <a:sym typeface="Roboto"/>
+                        </a:rPr>
+                        <a:t>(01/05)</a:t>
+                      </a:r>
+                      <a:endParaRPr dirty="0">
+                        <a:latin typeface="Roboto"/>
+                        <a:ea typeface="Roboto"/>
+                        <a:cs typeface="Roboto"/>
+                        <a:sym typeface="Roboto"/>
+                      </a:endParaRPr>
+                    </a:p>
+                  </a:txBody>
+                  <a:tcPr marL="91425" marR="91425" marT="91425" marB="91425">
+                    <a:lnL w="12700" cap="flat" cmpd="sng" algn="ctr">
+                      <a:solidFill>
+                        <a:schemeClr val="tx1"/>
+                      </a:solidFill>
+                      <a:prstDash val="solid"/>
+                      <a:round/>
+                      <a:headEnd type="none" w="med" len="med"/>
+                      <a:tailEnd type="none" w="med" len="med"/>
+                    </a:lnL>
+                    <a:lnR w="9525" cap="flat" cmpd="sng" algn="ctr">
+                      <a:solidFill>
+                        <a:srgbClr val="9E9E9E"/>
+                      </a:solidFill>
+                      <a:prstDash val="solid"/>
+                      <a:round/>
+                      <a:headEnd type="none" w="sm" len="sm"/>
+                      <a:tailEnd type="none" w="sm" len="sm"/>
+                    </a:lnR>
+                    <a:lnT w="9525" cap="flat" cmpd="sng">
+                      <a:solidFill>
+                        <a:srgbClr val="9E9E9E"/>
+                      </a:solidFill>
+                      <a:prstDash val="solid"/>
+                      <a:round/>
+                      <a:headEnd type="none" w="sm" len="sm"/>
+                      <a:tailEnd type="none" w="sm" len="sm"/>
+                    </a:lnT>
+                    <a:lnB w="9525" cap="flat" cmpd="sng">
+                      <a:solidFill>
+                        <a:srgbClr val="9E9E9E"/>
+                      </a:solidFill>
+                      <a:prstDash val="solid"/>
+                      <a:round/>
+                      <a:headEnd type="none" w="sm" len="sm"/>
+                      <a:tailEnd type="none" w="sm" len="sm"/>
+                    </a:lnB>
+                    <a:solidFill>
+                      <a:srgbClr val="052A4D"/>
+                    </a:solidFill>
+                  </a:tcPr>
+                </a:tc>
+                <a:tc>
+                  <a:txBody>
+                    <a:bodyPr/>
+                    <a:lstStyle/>
+                    <a:p>
+                      <a:pPr marL="0" lvl="0" indent="0" algn="l" rtl="0">
+                        <a:spcBef>
+                          <a:spcPts val="0"/>
+                        </a:spcBef>
+                        <a:spcAft>
+                          <a:spcPts val="0"/>
+                        </a:spcAft>
+                        <a:buNone/>
+                      </a:pPr>
+                      <a:r>
+                        <a:rPr lang="en-US" sz="1100" b="1" dirty="0" err="1">
+                          <a:solidFill>
+                            <a:srgbClr val="FFFFFF"/>
+                          </a:solidFill>
+                          <a:latin typeface="Roboto"/>
+                          <a:ea typeface="Roboto"/>
+                          <a:cs typeface="Roboto"/>
+                          <a:sym typeface="Roboto"/>
+                        </a:rPr>
+                        <a:t>Dia</a:t>
+                      </a:r>
+                      <a:r>
+                        <a:rPr lang="en-US" sz="1100" b="1" dirty="0">
+                          <a:solidFill>
+                            <a:srgbClr val="FFFFFF"/>
+                          </a:solidFill>
+                          <a:latin typeface="Roboto"/>
+                          <a:ea typeface="Roboto"/>
+                          <a:cs typeface="Roboto"/>
+                          <a:sym typeface="Roboto"/>
+                        </a:rPr>
+                        <a:t> 21 </a:t>
+                      </a:r>
+                      <a:r>
+                        <a:rPr lang="en-US" sz="1000" dirty="0">
+                          <a:solidFill>
+                            <a:srgbClr val="FFFFFF"/>
+                          </a:solidFill>
+                          <a:latin typeface="Roboto"/>
+                          <a:ea typeface="Roboto"/>
+                          <a:cs typeface="Roboto"/>
+                          <a:sym typeface="Roboto"/>
+                        </a:rPr>
+                        <a:t>(02/05)</a:t>
+                      </a:r>
+                      <a:endParaRPr dirty="0">
+                        <a:latin typeface="Roboto"/>
+                        <a:ea typeface="Roboto"/>
+                        <a:cs typeface="Roboto"/>
+                        <a:sym typeface="Roboto"/>
+                      </a:endParaRPr>
+                    </a:p>
+                  </a:txBody>
+                  <a:tcPr marL="91425" marR="91425" marT="91425" marB="91425">
+                    <a:lnL w="9525" cap="flat" cmpd="sng" algn="ctr">
+                      <a:solidFill>
+                        <a:srgbClr val="9E9E9E"/>
+                      </a:solidFill>
+                      <a:prstDash val="solid"/>
+                      <a:round/>
+                      <a:headEnd type="none" w="sm" len="sm"/>
+                      <a:tailEnd type="none" w="sm" len="sm"/>
+                    </a:lnL>
+                    <a:lnR w="9525" cap="flat" cmpd="sng">
+                      <a:solidFill>
+                        <a:srgbClr val="9E9E9E"/>
+                      </a:solidFill>
+                      <a:prstDash val="solid"/>
+                      <a:round/>
+                      <a:headEnd type="none" w="sm" len="sm"/>
+                      <a:tailEnd type="none" w="sm" len="sm"/>
+                    </a:lnR>
+                    <a:lnT w="9525" cap="flat" cmpd="sng">
+                      <a:solidFill>
+                        <a:srgbClr val="9E9E9E"/>
+                      </a:solidFill>
+                      <a:prstDash val="solid"/>
+                      <a:round/>
+                      <a:headEnd type="none" w="sm" len="sm"/>
+                      <a:tailEnd type="none" w="sm" len="sm"/>
+                    </a:lnT>
+                    <a:lnB w="9525" cap="flat" cmpd="sng">
+                      <a:solidFill>
+                        <a:srgbClr val="9E9E9E"/>
+                      </a:solidFill>
+                      <a:prstDash val="solid"/>
+                      <a:round/>
+                      <a:headEnd type="none" w="sm" len="sm"/>
+                      <a:tailEnd type="none" w="sm" len="sm"/>
+                    </a:lnB>
+                    <a:solidFill>
+                      <a:srgbClr val="052A4D"/>
+                    </a:solidFill>
+                  </a:tcPr>
+                </a:tc>
+                <a:extLst>
+                  <a:ext uri="{0D108BD9-81ED-4DB2-BD59-A6C34878D82A}">
+                    <a16:rowId xmlns:a16="http://schemas.microsoft.com/office/drawing/2014/main" val="2320319750"/>
+                  </a:ext>
+                </a:extLst>
+              </a:tr>
+              <a:tr h="836162">
                 <a:tc>
                   <a:txBody>
                     <a:bodyPr/>
@@ -20299,11 +21574,11 @@
                 </a:tc>
                 <a:extLst>
                   <a:ext uri="{0D108BD9-81ED-4DB2-BD59-A6C34878D82A}">
-                    <a16:rowId xmlns:a16="http://schemas.microsoft.com/office/drawing/2014/main" val="10004"/>
+                    <a16:rowId xmlns:a16="http://schemas.microsoft.com/office/drawing/2014/main" val="3300266234"/>
                   </a:ext>
                 </a:extLst>
               </a:tr>
-              <a:tr h="837750">
+              <a:tr h="845779">
                 <a:tc gridSpan="6">
                   <a:txBody>
                     <a:bodyPr/>
@@ -20618,7 +21893,7 @@
                 </a:tc>
                 <a:extLst>
                   <a:ext uri="{0D108BD9-81ED-4DB2-BD59-A6C34878D82A}">
-                    <a16:rowId xmlns:a16="http://schemas.microsoft.com/office/drawing/2014/main" val="10005"/>
+                    <a16:rowId xmlns:a16="http://schemas.microsoft.com/office/drawing/2014/main" val="39178132"/>
                   </a:ext>
                 </a:extLst>
               </a:tr>

</xml_diff>